<commit_message>
added more dialogue and descriptions
</commit_message>
<xml_diff>
--- a/ppt/GameOfDeath.pptx
+++ b/ppt/GameOfDeath.pptx
@@ -1334,7 +1334,7 @@
             <a:fld id="{9334D819-9F07-4261-B09B-9E467E5D9002}" type="datetimeFigureOut">
               <a:rPr lang="en-US" dirty="0"/>
               <a:pPr/>
-              <a:t>3/11/2020</a:t>
+              <a:t>3/12/2020</a:t>
             </a:fld>
             <a:endParaRPr lang="en-US" dirty="0"/>
           </a:p>
@@ -1568,7 +1568,7 @@
           <a:p>
             <a:fld id="{9334D819-9F07-4261-B09B-9E467E5D9002}" type="datetimeFigureOut">
               <a:rPr lang="en-US" dirty="0"/>
-              <a:t>3/11/2020</a:t>
+              <a:t>3/12/2020</a:t>
             </a:fld>
             <a:endParaRPr lang="en-US" dirty="0"/>
           </a:p>
@@ -1743,7 +1743,7 @@
           <a:p>
             <a:fld id="{9334D819-9F07-4261-B09B-9E467E5D9002}" type="datetimeFigureOut">
               <a:rPr lang="en-US" dirty="0"/>
-              <a:t>3/11/2020</a:t>
+              <a:t>3/12/2020</a:t>
             </a:fld>
             <a:endParaRPr lang="en-US" dirty="0"/>
           </a:p>
@@ -1908,7 +1908,7 @@
           <a:p>
             <a:fld id="{9334D819-9F07-4261-B09B-9E467E5D9002}" type="datetimeFigureOut">
               <a:rPr lang="en-US" dirty="0"/>
-              <a:t>3/11/2020</a:t>
+              <a:t>3/12/2020</a:t>
             </a:fld>
             <a:endParaRPr lang="en-US" dirty="0"/>
           </a:p>
@@ -2180,7 +2180,7 @@
             <a:fld id="{9334D819-9F07-4261-B09B-9E467E5D9002}" type="datetimeFigureOut">
               <a:rPr lang="en-US" dirty="0"/>
               <a:pPr/>
-              <a:t>3/11/2020</a:t>
+              <a:t>3/12/2020</a:t>
             </a:fld>
             <a:endParaRPr lang="en-US" dirty="0"/>
           </a:p>
@@ -3377,7 +3377,7 @@
           <a:p>
             <a:fld id="{9334D819-9F07-4261-B09B-9E467E5D9002}" type="datetimeFigureOut">
               <a:rPr lang="en-US" dirty="0"/>
-              <a:t>3/11/2020</a:t>
+              <a:t>3/12/2020</a:t>
             </a:fld>
             <a:endParaRPr lang="en-US" dirty="0"/>
           </a:p>
@@ -3762,7 +3762,7 @@
           <a:p>
             <a:fld id="{9334D819-9F07-4261-B09B-9E467E5D9002}" type="datetimeFigureOut">
               <a:rPr lang="en-US" dirty="0"/>
-              <a:t>3/11/2020</a:t>
+              <a:t>3/12/2020</a:t>
             </a:fld>
             <a:endParaRPr lang="en-US" dirty="0"/>
           </a:p>
@@ -3880,7 +3880,7 @@
           <a:p>
             <a:fld id="{9334D819-9F07-4261-B09B-9E467E5D9002}" type="datetimeFigureOut">
               <a:rPr lang="en-US" dirty="0"/>
-              <a:t>3/11/2020</a:t>
+              <a:t>3/12/2020</a:t>
             </a:fld>
             <a:endParaRPr lang="en-US" dirty="0"/>
           </a:p>
@@ -3970,7 +3970,7 @@
           <a:p>
             <a:fld id="{9334D819-9F07-4261-B09B-9E467E5D9002}" type="datetimeFigureOut">
               <a:rPr lang="en-US" dirty="0"/>
-              <a:t>3/11/2020</a:t>
+              <a:t>3/12/2020</a:t>
             </a:fld>
             <a:endParaRPr lang="en-US" dirty="0"/>
           </a:p>
@@ -4728,7 +4728,7 @@
           <a:p>
             <a:fld id="{9334D819-9F07-4261-B09B-9E467E5D9002}" type="datetimeFigureOut">
               <a:rPr lang="en-US" dirty="0"/>
-              <a:t>3/11/2020</a:t>
+              <a:t>3/12/2020</a:t>
             </a:fld>
             <a:endParaRPr lang="en-US" dirty="0"/>
           </a:p>
@@ -5563,7 +5563,7 @@
           <a:p>
             <a:fld id="{9334D819-9F07-4261-B09B-9E467E5D9002}" type="datetimeFigureOut">
               <a:rPr lang="en-US" dirty="0"/>
-              <a:t>3/11/2020</a:t>
+              <a:t>3/12/2020</a:t>
             </a:fld>
             <a:endParaRPr lang="en-US" dirty="0"/>
           </a:p>
@@ -5786,7 +5786,7 @@
             <a:fld id="{9334D819-9F07-4261-B09B-9E467E5D9002}" type="datetimeFigureOut">
               <a:rPr lang="en-US" dirty="0"/>
               <a:pPr/>
-              <a:t>3/11/2020</a:t>
+              <a:t>3/12/2020</a:t>
             </a:fld>
             <a:endParaRPr lang="en-US" dirty="0"/>
           </a:p>
@@ -7108,25 +7108,25 @@
           <a:p>
             <a:r>
               <a:rPr lang="en-AU" dirty="0"/>
-              <a:t>A colourful and slightly-comical text-based adventure based on the movie ‘Game of Death’ from 1978.</a:t>
+              <a:t>A colourful, interactive and light-hearted text-based adventure based on the unreleased version of the movie ‘Game of Death’, written by Bruce Lee.</a:t>
             </a:r>
           </a:p>
           <a:p>
             <a:r>
               <a:rPr lang="en-AU" dirty="0"/>
-              <a:t>It’s a game which takes a single player on a brief adventure into enemy territory to save their girlfriend from the 5 evil bosses.</a:t>
+              <a:t>It’s a game which takes a single player on a brief adventure into enemy territory to save their girlfriend from 5 evil bosses.</a:t>
             </a:r>
           </a:p>
           <a:p>
             <a:r>
               <a:rPr lang="en-AU" dirty="0"/>
-              <a:t>It allows the player to make direct choices which have a direct impact on the other characters.</a:t>
+              <a:t>It allows the player to make direct choices which have a direct impact on the other characters’ physicality and ability to fight.</a:t>
             </a:r>
           </a:p>
           <a:p>
             <a:r>
               <a:rPr lang="en-AU" dirty="0"/>
-              <a:t>It will not be easy!</a:t>
+              <a:t>It will be challenging!</a:t>
             </a:r>
           </a:p>
         </p:txBody>
@@ -8939,7 +8939,7 @@
         </p:blipFill>
         <p:spPr>
           <a:xfrm>
-            <a:off x="1664448" y="643466"/>
+            <a:off x="556197" y="232649"/>
             <a:ext cx="4988143" cy="5581368"/>
           </a:xfrm>
           <a:prstGeom prst="rect">
@@ -8968,14 +8968,60 @@
         </p:blipFill>
         <p:spPr>
           <a:xfrm>
-            <a:off x="6710820" y="1842051"/>
-            <a:ext cx="5197716" cy="3435779"/>
+            <a:off x="5544339" y="2386811"/>
+            <a:ext cx="6433309" cy="4252527"/>
           </a:xfrm>
           <a:prstGeom prst="rect">
             <a:avLst/>
           </a:prstGeom>
         </p:spPr>
       </p:pic>
+      <p:sp>
+        <p:nvSpPr>
+          <p:cNvPr id="2" name="Arrow: Right 1">
+            <a:extLst>
+              <a:ext uri="{FF2B5EF4-FFF2-40B4-BE49-F238E27FC236}">
+                <a16:creationId xmlns:a16="http://schemas.microsoft.com/office/drawing/2014/main" id="{AA7535FC-1965-4255-BB2A-07D1C3F6FB6C}"/>
+              </a:ext>
+            </a:extLst>
+          </p:cNvPr>
+          <p:cNvSpPr/>
+          <p:nvPr/>
+        </p:nvSpPr>
+        <p:spPr>
+          <a:xfrm rot="17393968">
+            <a:off x="3381844" y="3895282"/>
+            <a:ext cx="3327323" cy="384313"/>
+          </a:xfrm>
+          <a:prstGeom prst="rightArrow">
+            <a:avLst/>
+          </a:prstGeom>
+        </p:spPr>
+        <p:style>
+          <a:lnRef idx="2">
+            <a:schemeClr val="accent1">
+              <a:shade val="50000"/>
+            </a:schemeClr>
+          </a:lnRef>
+          <a:fillRef idx="1">
+            <a:schemeClr val="accent1"/>
+          </a:fillRef>
+          <a:effectRef idx="0">
+            <a:schemeClr val="accent1"/>
+          </a:effectRef>
+          <a:fontRef idx="minor">
+            <a:schemeClr val="lt1"/>
+          </a:fontRef>
+        </p:style>
+        <p:txBody>
+          <a:bodyPr rtlCol="0" anchor="ctr"/>
+          <a:lstStyle/>
+          <a:p>
+            <a:pPr algn="ctr"/>
+            <a:endParaRPr lang="en-AU"/>
+          </a:p>
+        </p:txBody>
+      </p:sp>
     </p:spTree>
     <p:extLst>
       <p:ext uri="{BB962C8B-B14F-4D97-AF65-F5344CB8AC3E}">
@@ -10651,8 +10697,8 @@
         </p:blipFill>
         <p:spPr>
           <a:xfrm>
-            <a:off x="2682009" y="965198"/>
-            <a:ext cx="7565680" cy="4927601"/>
+            <a:off x="1383295" y="435111"/>
+            <a:ext cx="10089614" cy="6253095"/>
           </a:xfrm>
           <a:prstGeom prst="rect">
             <a:avLst/>
@@ -12334,8 +12380,8 @@
         </p:blipFill>
         <p:spPr>
           <a:xfrm>
-            <a:off x="1842868" y="796016"/>
-            <a:ext cx="9200270" cy="5284585"/>
+            <a:off x="1491631" y="504468"/>
+            <a:ext cx="9981278" cy="5733192"/>
           </a:xfrm>
           <a:prstGeom prst="rect">
             <a:avLst/>
@@ -14012,13 +14058,13 @@
         </p:nvPicPr>
         <p:blipFill rotWithShape="1">
           <a:blip r:embed="rId2"/>
-          <a:srcRect l="20539" t="12904" r="9769" b="18754"/>
+          <a:srcRect l="20539" t="13838" r="9769" b="18754"/>
           <a:stretch/>
         </p:blipFill>
         <p:spPr>
           <a:xfrm>
-            <a:off x="2084757" y="965199"/>
-            <a:ext cx="8760180" cy="4927601"/>
+            <a:off x="1112395" y="436727"/>
+            <a:ext cx="10549518" cy="5852975"/>
           </a:xfrm>
           <a:prstGeom prst="rect">
             <a:avLst/>
@@ -15695,13 +15741,13 @@
         </p:nvPicPr>
         <p:blipFill rotWithShape="1">
           <a:blip r:embed="rId2"/>
-          <a:srcRect l="20423" t="21730" r="10577" b="52822"/>
+          <a:srcRect l="20423" t="22001" r="10577" b="52822"/>
           <a:stretch/>
         </p:blipFill>
         <p:spPr>
           <a:xfrm>
-            <a:off x="2084759" y="965199"/>
-            <a:ext cx="8760180" cy="2463800"/>
+            <a:off x="1112395" y="630214"/>
+            <a:ext cx="10682856" cy="2712135"/>
           </a:xfrm>
           <a:prstGeom prst="rect">
             <a:avLst/>

</xml_diff>